<commit_message>
Mise à jour des fichiers ipynb
</commit_message>
<xml_diff>
--- a/DEMO_DAY_Essential.pptx
+++ b/DEMO_DAY_Essential.pptx
@@ -121,6 +121,271 @@
     </p:ext>
   </p:extLst>
 </p:presentation>
+</file>
+
+<file path=ppt/changesInfos/changesInfo1.xml><?xml version="1.0" encoding="utf-8"?>
+<pc:chgInfo xmlns:a="http://schemas.openxmlformats.org/drawingml/2006/main" xmlns:r="http://schemas.openxmlformats.org/officeDocument/2006/relationships" xmlns:ac="http://schemas.microsoft.com/office/drawing/2013/main/command" xmlns:pc="http://schemas.microsoft.com/office/powerpoint/2013/main/command">
+  <pc:docChgLst>
+    <pc:chgData name="Stéphane DURIG" userId="9bd06f3e9ca2bf29" providerId="LiveId" clId="{4322989C-1BB1-4C94-91D4-3644A679C2C0}"/>
+    <pc:docChg chg="undo custSel modSld">
+      <pc:chgData name="Stéphane DURIG" userId="9bd06f3e9ca2bf29" providerId="LiveId" clId="{4322989C-1BB1-4C94-91D4-3644A679C2C0}" dt="2023-08-21T15:32:10.433" v="618" actId="478"/>
+      <pc:docMkLst>
+        <pc:docMk/>
+      </pc:docMkLst>
+      <pc:sldChg chg="addSp delSp modSp mod">
+        <pc:chgData name="Stéphane DURIG" userId="9bd06f3e9ca2bf29" providerId="LiveId" clId="{4322989C-1BB1-4C94-91D4-3644A679C2C0}" dt="2023-08-21T15:27:29.199" v="506" actId="1076"/>
+        <pc:sldMkLst>
+          <pc:docMk/>
+          <pc:sldMk cId="2301068105" sldId="261"/>
+        </pc:sldMkLst>
+        <pc:spChg chg="add del mod">
+          <ac:chgData name="Stéphane DURIG" userId="9bd06f3e9ca2bf29" providerId="LiveId" clId="{4322989C-1BB1-4C94-91D4-3644A679C2C0}" dt="2023-08-21T15:11:50.613" v="143" actId="478"/>
+          <ac:spMkLst>
+            <pc:docMk/>
+            <pc:sldMk cId="2301068105" sldId="261"/>
+            <ac:spMk id="12" creationId="{0137431E-4A29-D566-9340-3012666FE77E}"/>
+          </ac:spMkLst>
+        </pc:spChg>
+        <pc:picChg chg="add mod">
+          <ac:chgData name="Stéphane DURIG" userId="9bd06f3e9ca2bf29" providerId="LiveId" clId="{4322989C-1BB1-4C94-91D4-3644A679C2C0}" dt="2023-08-21T15:19:25.130" v="419" actId="1036"/>
+          <ac:picMkLst>
+            <pc:docMk/>
+            <pc:sldMk cId="2301068105" sldId="261"/>
+            <ac:picMk id="4" creationId="{87B162CD-29C9-8282-54D3-42305A05BBDB}"/>
+          </ac:picMkLst>
+        </pc:picChg>
+        <pc:picChg chg="del">
+          <ac:chgData name="Stéphane DURIG" userId="9bd06f3e9ca2bf29" providerId="LiveId" clId="{4322989C-1BB1-4C94-91D4-3644A679C2C0}" dt="2023-08-21T15:11:36.383" v="110" actId="478"/>
+          <ac:picMkLst>
+            <pc:docMk/>
+            <pc:sldMk cId="2301068105" sldId="261"/>
+            <ac:picMk id="5" creationId="{D3FEC8BE-7821-88C0-C85D-A0000728BDC9}"/>
+          </ac:picMkLst>
+        </pc:picChg>
+        <pc:picChg chg="add del mod">
+          <ac:chgData name="Stéphane DURIG" userId="9bd06f3e9ca2bf29" providerId="LiveId" clId="{4322989C-1BB1-4C94-91D4-3644A679C2C0}" dt="2023-08-21T15:06:19.736" v="80" actId="478"/>
+          <ac:picMkLst>
+            <pc:docMk/>
+            <pc:sldMk cId="2301068105" sldId="261"/>
+            <ac:picMk id="7" creationId="{E3D66CCB-C971-A7B2-7589-B493F299F3FB}"/>
+          </ac:picMkLst>
+        </pc:picChg>
+        <pc:picChg chg="del">
+          <ac:chgData name="Stéphane DURIG" userId="9bd06f3e9ca2bf29" providerId="LiveId" clId="{4322989C-1BB1-4C94-91D4-3644A679C2C0}" dt="2023-08-21T15:04:07.361" v="6" actId="478"/>
+          <ac:picMkLst>
+            <pc:docMk/>
+            <pc:sldMk cId="2301068105" sldId="261"/>
+            <ac:picMk id="8" creationId="{90E223D6-7540-76A8-0BB0-A844538B65DD}"/>
+          </ac:picMkLst>
+        </pc:picChg>
+        <pc:picChg chg="add del mod">
+          <ac:chgData name="Stéphane DURIG" userId="9bd06f3e9ca2bf29" providerId="LiveId" clId="{4322989C-1BB1-4C94-91D4-3644A679C2C0}" dt="2023-08-21T15:27:23.774" v="505" actId="478"/>
+          <ac:picMkLst>
+            <pc:docMk/>
+            <pc:sldMk cId="2301068105" sldId="261"/>
+            <ac:picMk id="10" creationId="{915A74D0-7BA8-A362-370D-1D057FCBA516}"/>
+          </ac:picMkLst>
+        </pc:picChg>
+        <pc:picChg chg="add mod">
+          <ac:chgData name="Stéphane DURIG" userId="9bd06f3e9ca2bf29" providerId="LiveId" clId="{4322989C-1BB1-4C94-91D4-3644A679C2C0}" dt="2023-08-21T15:27:29.199" v="506" actId="1076"/>
+          <ac:picMkLst>
+            <pc:docMk/>
+            <pc:sldMk cId="2301068105" sldId="261"/>
+            <ac:picMk id="14" creationId="{6A2A4647-7262-15CB-0D26-15EA2FCE6F33}"/>
+          </ac:picMkLst>
+        </pc:picChg>
+      </pc:sldChg>
+      <pc:sldChg chg="addSp delSp modSp mod">
+        <pc:chgData name="Stéphane DURIG" userId="9bd06f3e9ca2bf29" providerId="LiveId" clId="{4322989C-1BB1-4C94-91D4-3644A679C2C0}" dt="2023-08-21T15:26:34.915" v="501" actId="1038"/>
+        <pc:sldMkLst>
+          <pc:docMk/>
+          <pc:sldMk cId="3907269742" sldId="264"/>
+        </pc:sldMkLst>
+        <pc:spChg chg="add del">
+          <ac:chgData name="Stéphane DURIG" userId="9bd06f3e9ca2bf29" providerId="LiveId" clId="{4322989C-1BB1-4C94-91D4-3644A679C2C0}" dt="2023-08-21T15:24:58.347" v="422" actId="22"/>
+          <ac:spMkLst>
+            <pc:docMk/>
+            <pc:sldMk cId="3907269742" sldId="264"/>
+            <ac:spMk id="5" creationId="{4C9C600B-8213-FC90-4E8A-FCFB14C19BFF}"/>
+          </ac:spMkLst>
+        </pc:spChg>
+        <pc:picChg chg="del">
+          <ac:chgData name="Stéphane DURIG" userId="9bd06f3e9ca2bf29" providerId="LiveId" clId="{4322989C-1BB1-4C94-91D4-3644A679C2C0}" dt="2023-08-21T15:26:30.154" v="491" actId="478"/>
+          <ac:picMkLst>
+            <pc:docMk/>
+            <pc:sldMk cId="3907269742" sldId="264"/>
+            <ac:picMk id="3" creationId="{44520479-2BA5-BFA9-A625-E357D57D5054}"/>
+          </ac:picMkLst>
+        </pc:picChg>
+        <pc:picChg chg="add mod">
+          <ac:chgData name="Stéphane DURIG" userId="9bd06f3e9ca2bf29" providerId="LiveId" clId="{4322989C-1BB1-4C94-91D4-3644A679C2C0}" dt="2023-08-21T15:26:34.915" v="501" actId="1038"/>
+          <ac:picMkLst>
+            <pc:docMk/>
+            <pc:sldMk cId="3907269742" sldId="264"/>
+            <ac:picMk id="8" creationId="{5C0C7BF5-E498-DB8E-9663-92204810DE07}"/>
+          </ac:picMkLst>
+        </pc:picChg>
+      </pc:sldChg>
+      <pc:sldChg chg="addSp delSp modSp mod">
+        <pc:chgData name="Stéphane DURIG" userId="9bd06f3e9ca2bf29" providerId="LiveId" clId="{4322989C-1BB1-4C94-91D4-3644A679C2C0}" dt="2023-08-21T15:25:43.456" v="487" actId="1038"/>
+        <pc:sldMkLst>
+          <pc:docMk/>
+          <pc:sldMk cId="1683761390" sldId="267"/>
+        </pc:sldMkLst>
+        <pc:picChg chg="add mod">
+          <ac:chgData name="Stéphane DURIG" userId="9bd06f3e9ca2bf29" providerId="LiveId" clId="{4322989C-1BB1-4C94-91D4-3644A679C2C0}" dt="2023-08-21T15:15:15.010" v="333" actId="1038"/>
+          <ac:picMkLst>
+            <pc:docMk/>
+            <pc:sldMk cId="1683761390" sldId="267"/>
+            <ac:picMk id="4" creationId="{5814AFE1-AC7A-36CC-FDB5-AB800E75E7B4}"/>
+          </ac:picMkLst>
+        </pc:picChg>
+        <pc:picChg chg="del">
+          <ac:chgData name="Stéphane DURIG" userId="9bd06f3e9ca2bf29" providerId="LiveId" clId="{4322989C-1BB1-4C94-91D4-3644A679C2C0}" dt="2023-08-21T15:25:34.433" v="425" actId="478"/>
+          <ac:picMkLst>
+            <pc:docMk/>
+            <pc:sldMk cId="1683761390" sldId="267"/>
+            <ac:picMk id="5" creationId="{AE045932-0EEC-7EEA-D360-EAE2DDBDB4BC}"/>
+          </ac:picMkLst>
+        </pc:picChg>
+        <pc:picChg chg="add mod">
+          <ac:chgData name="Stéphane DURIG" userId="9bd06f3e9ca2bf29" providerId="LiveId" clId="{4322989C-1BB1-4C94-91D4-3644A679C2C0}" dt="2023-08-21T15:15:10.618" v="320" actId="1037"/>
+          <ac:picMkLst>
+            <pc:docMk/>
+            <pc:sldMk cId="1683761390" sldId="267"/>
+            <ac:picMk id="7" creationId="{0C91C689-ABB9-87AF-C007-D1E21B11FD8F}"/>
+          </ac:picMkLst>
+        </pc:picChg>
+        <pc:picChg chg="del">
+          <ac:chgData name="Stéphane DURIG" userId="9bd06f3e9ca2bf29" providerId="LiveId" clId="{4322989C-1BB1-4C94-91D4-3644A679C2C0}" dt="2023-08-21T15:14:37.256" v="223" actId="478"/>
+          <ac:picMkLst>
+            <pc:docMk/>
+            <pc:sldMk cId="1683761390" sldId="267"/>
+            <ac:picMk id="8" creationId="{2D0E18F9-19E5-52BD-197A-68136C0BDDC5}"/>
+          </ac:picMkLst>
+        </pc:picChg>
+        <pc:picChg chg="del">
+          <ac:chgData name="Stéphane DURIG" userId="9bd06f3e9ca2bf29" providerId="LiveId" clId="{4322989C-1BB1-4C94-91D4-3644A679C2C0}" dt="2023-08-21T15:13:40.603" v="149" actId="478"/>
+          <ac:picMkLst>
+            <pc:docMk/>
+            <pc:sldMk cId="1683761390" sldId="267"/>
+            <ac:picMk id="10" creationId="{731727BA-9D94-E374-D5A3-69A9D6A8CF8E}"/>
+          </ac:picMkLst>
+        </pc:picChg>
+        <pc:picChg chg="add mod">
+          <ac:chgData name="Stéphane DURIG" userId="9bd06f3e9ca2bf29" providerId="LiveId" clId="{4322989C-1BB1-4C94-91D4-3644A679C2C0}" dt="2023-08-21T15:18:57.911" v="406" actId="1037"/>
+          <ac:picMkLst>
+            <pc:docMk/>
+            <pc:sldMk cId="1683761390" sldId="267"/>
+            <ac:picMk id="11" creationId="{DF0453D7-6ECA-253D-713B-B34F3A07437F}"/>
+          </ac:picMkLst>
+        </pc:picChg>
+        <pc:picChg chg="del">
+          <ac:chgData name="Stéphane DURIG" userId="9bd06f3e9ca2bf29" providerId="LiveId" clId="{4322989C-1BB1-4C94-91D4-3644A679C2C0}" dt="2023-08-21T15:18:48.656" v="362" actId="478"/>
+          <ac:picMkLst>
+            <pc:docMk/>
+            <pc:sldMk cId="1683761390" sldId="267"/>
+            <ac:picMk id="12" creationId="{498EA64B-92BB-1FB3-F4F9-37FAE8CCF09F}"/>
+          </ac:picMkLst>
+        </pc:picChg>
+        <pc:picChg chg="add mod">
+          <ac:chgData name="Stéphane DURIG" userId="9bd06f3e9ca2bf29" providerId="LiveId" clId="{4322989C-1BB1-4C94-91D4-3644A679C2C0}" dt="2023-08-21T15:25:43.456" v="487" actId="1038"/>
+          <ac:picMkLst>
+            <pc:docMk/>
+            <pc:sldMk cId="1683761390" sldId="267"/>
+            <ac:picMk id="14" creationId="{DD1DF088-9E36-6FDC-8EFD-1E7FC0512CE0}"/>
+          </ac:picMkLst>
+        </pc:picChg>
+      </pc:sldChg>
+      <pc:sldChg chg="addSp delSp modSp mod">
+        <pc:chgData name="Stéphane DURIG" userId="9bd06f3e9ca2bf29" providerId="LiveId" clId="{4322989C-1BB1-4C94-91D4-3644A679C2C0}" dt="2023-08-21T15:29:45.639" v="561" actId="478"/>
+        <pc:sldMkLst>
+          <pc:docMk/>
+          <pc:sldMk cId="721107164" sldId="269"/>
+        </pc:sldMkLst>
+        <pc:picChg chg="del">
+          <ac:chgData name="Stéphane DURIG" userId="9bd06f3e9ca2bf29" providerId="LiveId" clId="{4322989C-1BB1-4C94-91D4-3644A679C2C0}" dt="2023-08-21T15:29:45.639" v="561" actId="478"/>
+          <ac:picMkLst>
+            <pc:docMk/>
+            <pc:sldMk cId="721107164" sldId="269"/>
+            <ac:picMk id="3" creationId="{748BA0C2-E456-33AA-51F6-8C08E569EC48}"/>
+          </ac:picMkLst>
+        </pc:picChg>
+        <pc:picChg chg="del">
+          <ac:chgData name="Stéphane DURIG" userId="9bd06f3e9ca2bf29" providerId="LiveId" clId="{4322989C-1BB1-4C94-91D4-3644A679C2C0}" dt="2023-08-21T15:28:39.819" v="528" actId="478"/>
+          <ac:picMkLst>
+            <pc:docMk/>
+            <pc:sldMk cId="721107164" sldId="269"/>
+            <ac:picMk id="4" creationId="{1DA5AB4F-5500-6892-33EF-6EA1B95FBC7C}"/>
+          </ac:picMkLst>
+        </pc:picChg>
+        <pc:picChg chg="add mod">
+          <ac:chgData name="Stéphane DURIG" userId="9bd06f3e9ca2bf29" providerId="LiveId" clId="{4322989C-1BB1-4C94-91D4-3644A679C2C0}" dt="2023-08-21T15:28:46.291" v="557" actId="1038"/>
+          <ac:picMkLst>
+            <pc:docMk/>
+            <pc:sldMk cId="721107164" sldId="269"/>
+            <ac:picMk id="6" creationId="{B3618FEF-3CCD-FD1C-E0D4-CAC26FCFEDA1}"/>
+          </ac:picMkLst>
+        </pc:picChg>
+        <pc:picChg chg="add mod">
+          <ac:chgData name="Stéphane DURIG" userId="9bd06f3e9ca2bf29" providerId="LiveId" clId="{4322989C-1BB1-4C94-91D4-3644A679C2C0}" dt="2023-08-21T15:29:43.175" v="560" actId="14100"/>
+          <ac:picMkLst>
+            <pc:docMk/>
+            <pc:sldMk cId="721107164" sldId="269"/>
+            <ac:picMk id="8" creationId="{7A3DB0D9-83FA-0276-4A48-F43DEEC25AF7}"/>
+          </ac:picMkLst>
+        </pc:picChg>
+      </pc:sldChg>
+      <pc:sldChg chg="addSp delSp modSp mod">
+        <pc:chgData name="Stéphane DURIG" userId="9bd06f3e9ca2bf29" providerId="LiveId" clId="{4322989C-1BB1-4C94-91D4-3644A679C2C0}" dt="2023-08-21T15:32:10.433" v="618" actId="478"/>
+        <pc:sldMkLst>
+          <pc:docMk/>
+          <pc:sldMk cId="621640867" sldId="270"/>
+        </pc:sldMkLst>
+        <pc:picChg chg="add mod">
+          <ac:chgData name="Stéphane DURIG" userId="9bd06f3e9ca2bf29" providerId="LiveId" clId="{4322989C-1BB1-4C94-91D4-3644A679C2C0}" dt="2023-08-21T15:30:27.578" v="609" actId="1038"/>
+          <ac:picMkLst>
+            <pc:docMk/>
+            <pc:sldMk cId="621640867" sldId="270"/>
+            <ac:picMk id="4" creationId="{DB9FEE24-4F05-5181-DBF2-27573031639A}"/>
+          </ac:picMkLst>
+        </pc:picChg>
+        <pc:picChg chg="del">
+          <ac:chgData name="Stéphane DURIG" userId="9bd06f3e9ca2bf29" providerId="LiveId" clId="{4322989C-1BB1-4C94-91D4-3644A679C2C0}" dt="2023-08-21T15:30:23.531" v="585" actId="478"/>
+          <ac:picMkLst>
+            <pc:docMk/>
+            <pc:sldMk cId="621640867" sldId="270"/>
+            <ac:picMk id="6" creationId="{A1D0F1EC-4C92-7666-FCEC-B60E55D8A6E7}"/>
+          </ac:picMkLst>
+        </pc:picChg>
+        <pc:picChg chg="add del mod">
+          <ac:chgData name="Stéphane DURIG" userId="9bd06f3e9ca2bf29" providerId="LiveId" clId="{4322989C-1BB1-4C94-91D4-3644A679C2C0}" dt="2023-08-21T15:31:18.333" v="614" actId="478"/>
+          <ac:picMkLst>
+            <pc:docMk/>
+            <pc:sldMk cId="621640867" sldId="270"/>
+            <ac:picMk id="7" creationId="{9C257D42-00F1-6486-F467-514F0551180E}"/>
+          </ac:picMkLst>
+        </pc:picChg>
+        <pc:picChg chg="del">
+          <ac:chgData name="Stéphane DURIG" userId="9bd06f3e9ca2bf29" providerId="LiveId" clId="{4322989C-1BB1-4C94-91D4-3644A679C2C0}" dt="2023-08-21T15:32:10.433" v="618" actId="478"/>
+          <ac:picMkLst>
+            <pc:docMk/>
+            <pc:sldMk cId="621640867" sldId="270"/>
+            <ac:picMk id="8" creationId="{BF40E865-3E63-BE28-6F08-5E7253E742A0}"/>
+          </ac:picMkLst>
+        </pc:picChg>
+        <pc:picChg chg="add mod">
+          <ac:chgData name="Stéphane DURIG" userId="9bd06f3e9ca2bf29" providerId="LiveId" clId="{4322989C-1BB1-4C94-91D4-3644A679C2C0}" dt="2023-08-21T15:32:08.057" v="617" actId="14100"/>
+          <ac:picMkLst>
+            <pc:docMk/>
+            <pc:sldMk cId="621640867" sldId="270"/>
+            <ac:picMk id="10" creationId="{829A5A6A-D583-6250-3031-2A746735C425}"/>
+          </ac:picMkLst>
+        </pc:picChg>
+      </pc:sldChg>
+    </pc:docChg>
+  </pc:docChgLst>
+</pc:chgInfo>
 </file>
 
 <file path=ppt/diagrams/colors1.xml><?xml version="1.0" encoding="utf-8"?>
@@ -15762,7 +16027,7 @@
           <a:p>
             <a:fld id="{931644F0-8A51-D947-B3E5-1925CE6A4B18}" type="datetimeFigureOut">
               <a:rPr lang="fr-FR" smtClean="0"/>
-              <a:t>20/08/2023</a:t>
+              <a:t>21/08/2023</a:t>
             </a:fld>
             <a:endParaRPr lang="fr-FR"/>
           </a:p>
@@ -15960,7 +16225,7 @@
           <a:p>
             <a:fld id="{931644F0-8A51-D947-B3E5-1925CE6A4B18}" type="datetimeFigureOut">
               <a:rPr lang="fr-FR" smtClean="0"/>
-              <a:t>20/08/2023</a:t>
+              <a:t>21/08/2023</a:t>
             </a:fld>
             <a:endParaRPr lang="fr-FR"/>
           </a:p>
@@ -16168,7 +16433,7 @@
           <a:p>
             <a:fld id="{931644F0-8A51-D947-B3E5-1925CE6A4B18}" type="datetimeFigureOut">
               <a:rPr lang="fr-FR" smtClean="0"/>
-              <a:t>20/08/2023</a:t>
+              <a:t>21/08/2023</a:t>
             </a:fld>
             <a:endParaRPr lang="fr-FR"/>
           </a:p>
@@ -16366,7 +16631,7 @@
           <a:p>
             <a:fld id="{931644F0-8A51-D947-B3E5-1925CE6A4B18}" type="datetimeFigureOut">
               <a:rPr lang="fr-FR" smtClean="0"/>
-              <a:t>20/08/2023</a:t>
+              <a:t>21/08/2023</a:t>
             </a:fld>
             <a:endParaRPr lang="fr-FR"/>
           </a:p>
@@ -16641,7 +16906,7 @@
           <a:p>
             <a:fld id="{931644F0-8A51-D947-B3E5-1925CE6A4B18}" type="datetimeFigureOut">
               <a:rPr lang="fr-FR" smtClean="0"/>
-              <a:t>20/08/2023</a:t>
+              <a:t>21/08/2023</a:t>
             </a:fld>
             <a:endParaRPr lang="fr-FR"/>
           </a:p>
@@ -16906,7 +17171,7 @@
           <a:p>
             <a:fld id="{931644F0-8A51-D947-B3E5-1925CE6A4B18}" type="datetimeFigureOut">
               <a:rPr lang="fr-FR" smtClean="0"/>
-              <a:t>20/08/2023</a:t>
+              <a:t>21/08/2023</a:t>
             </a:fld>
             <a:endParaRPr lang="fr-FR"/>
           </a:p>
@@ -17318,7 +17583,7 @@
           <a:p>
             <a:fld id="{931644F0-8A51-D947-B3E5-1925CE6A4B18}" type="datetimeFigureOut">
               <a:rPr lang="fr-FR" smtClean="0"/>
-              <a:t>20/08/2023</a:t>
+              <a:t>21/08/2023</a:t>
             </a:fld>
             <a:endParaRPr lang="fr-FR"/>
           </a:p>
@@ -17459,7 +17724,7 @@
           <a:p>
             <a:fld id="{931644F0-8A51-D947-B3E5-1925CE6A4B18}" type="datetimeFigureOut">
               <a:rPr lang="fr-FR" smtClean="0"/>
-              <a:t>20/08/2023</a:t>
+              <a:t>21/08/2023</a:t>
             </a:fld>
             <a:endParaRPr lang="fr-FR"/>
           </a:p>
@@ -17572,7 +17837,7 @@
           <a:p>
             <a:fld id="{931644F0-8A51-D947-B3E5-1925CE6A4B18}" type="datetimeFigureOut">
               <a:rPr lang="fr-FR" smtClean="0"/>
-              <a:t>20/08/2023</a:t>
+              <a:t>21/08/2023</a:t>
             </a:fld>
             <a:endParaRPr lang="fr-FR"/>
           </a:p>
@@ -17883,7 +18148,7 @@
           <a:p>
             <a:fld id="{931644F0-8A51-D947-B3E5-1925CE6A4B18}" type="datetimeFigureOut">
               <a:rPr lang="fr-FR" smtClean="0"/>
-              <a:t>20/08/2023</a:t>
+              <a:t>21/08/2023</a:t>
             </a:fld>
             <a:endParaRPr lang="fr-FR"/>
           </a:p>
@@ -18171,7 +18436,7 @@
           <a:p>
             <a:fld id="{931644F0-8A51-D947-B3E5-1925CE6A4B18}" type="datetimeFigureOut">
               <a:rPr lang="fr-FR" smtClean="0"/>
-              <a:t>20/08/2023</a:t>
+              <a:t>21/08/2023</a:t>
             </a:fld>
             <a:endParaRPr lang="fr-FR"/>
           </a:p>
@@ -18412,7 +18677,7 @@
           <a:p>
             <a:fld id="{931644F0-8A51-D947-B3E5-1925CE6A4B18}" type="datetimeFigureOut">
               <a:rPr lang="fr-FR" smtClean="0"/>
-              <a:t>20/08/2023</a:t>
+              <a:t>21/08/2023</a:t>
             </a:fld>
             <a:endParaRPr lang="fr-FR"/>
           </a:p>
@@ -19281,10 +19546,10 @@
       </p:sp>
       <p:pic>
         <p:nvPicPr>
-          <p:cNvPr id="6" name="Image 5">
+          <p:cNvPr id="4" name="Image 3">
             <a:extLst>
               <a:ext uri="{FF2B5EF4-FFF2-40B4-BE49-F238E27FC236}">
-                <a16:creationId xmlns:a16="http://schemas.microsoft.com/office/drawing/2014/main" id="{A1D0F1EC-4C92-7666-FCEC-B60E55D8A6E7}"/>
+                <a16:creationId xmlns:a16="http://schemas.microsoft.com/office/drawing/2014/main" id="{DB9FEE24-4F05-5181-DBF2-27573031639A}"/>
               </a:ext>
             </a:extLst>
           </p:cNvPr>
@@ -19301,8 +19566,8 @@
         </p:blipFill>
         <p:spPr>
           <a:xfrm>
-            <a:off x="6361975" y="640080"/>
-            <a:ext cx="5003800" cy="419100"/>
+            <a:off x="6313699" y="494022"/>
+            <a:ext cx="5429964" cy="717754"/>
           </a:xfrm>
           <a:prstGeom prst="rect">
             <a:avLst/>
@@ -19311,10 +19576,10 @@
       </p:pic>
       <p:pic>
         <p:nvPicPr>
-          <p:cNvPr id="8" name="Image 7" descr="Une image contenant graphique&#10;&#10;Description générée automatiquement">
+          <p:cNvPr id="10" name="Image 9">
             <a:extLst>
               <a:ext uri="{FF2B5EF4-FFF2-40B4-BE49-F238E27FC236}">
-                <a16:creationId xmlns:a16="http://schemas.microsoft.com/office/drawing/2014/main" id="{BF40E865-3E63-BE28-6F08-5E7253E742A0}"/>
+                <a16:creationId xmlns:a16="http://schemas.microsoft.com/office/drawing/2014/main" id="{829A5A6A-D583-6250-3031-2A746735C425}"/>
               </a:ext>
             </a:extLst>
           </p:cNvPr>
@@ -19323,15 +19588,16 @@
           </p:cNvPicPr>
           <p:nvPr/>
         </p:nvPicPr>
-        <p:blipFill rotWithShape="1">
+        <p:blipFill>
           <a:blip r:embed="rId3"/>
-          <a:srcRect l="7149" b="3972"/>
-          <a:stretch/>
+          <a:stretch>
+            <a:fillRect/>
+          </a:stretch>
         </p:blipFill>
         <p:spPr>
           <a:xfrm>
-            <a:off x="5535750" y="1343025"/>
-            <a:ext cx="6656250" cy="5278440"/>
+            <a:off x="5705952" y="1343025"/>
+            <a:ext cx="6374650" cy="4954258"/>
           </a:xfrm>
           <a:prstGeom prst="rect">
             <a:avLst/>
@@ -22816,65 +23082,6 @@
           </a:fontRef>
         </p:style>
       </p:cxnSp>
-      <p:pic>
-        <p:nvPicPr>
-          <p:cNvPr id="5" name="Espace réservé du contenu 4" descr="Une image contenant graphique&#10;&#10;Description générée automatiquement">
-            <a:extLst>
-              <a:ext uri="{FF2B5EF4-FFF2-40B4-BE49-F238E27FC236}">
-                <a16:creationId xmlns:a16="http://schemas.microsoft.com/office/drawing/2014/main" id="{D3FEC8BE-7821-88C0-C85D-A0000728BDC9}"/>
-              </a:ext>
-            </a:extLst>
-          </p:cNvPr>
-          <p:cNvPicPr>
-            <a:picLocks noGrp="1" noChangeAspect="1"/>
-          </p:cNvPicPr>
-          <p:nvPr>
-            <p:ph idx="1"/>
-          </p:nvPr>
-        </p:nvPicPr>
-        <p:blipFill>
-          <a:blip r:embed="rId2"/>
-          <a:stretch>
-            <a:fillRect/>
-          </a:stretch>
-        </p:blipFill>
-        <p:spPr>
-          <a:xfrm>
-            <a:off x="6605587" y="640080"/>
-            <a:ext cx="4725356" cy="6101093"/>
-          </a:xfrm>
-        </p:spPr>
-      </p:pic>
-      <p:pic>
-        <p:nvPicPr>
-          <p:cNvPr id="8" name="Image 7">
-            <a:extLst>
-              <a:ext uri="{FF2B5EF4-FFF2-40B4-BE49-F238E27FC236}">
-                <a16:creationId xmlns:a16="http://schemas.microsoft.com/office/drawing/2014/main" id="{90E223D6-7540-76A8-0BB0-A844538B65DD}"/>
-              </a:ext>
-            </a:extLst>
-          </p:cNvPr>
-          <p:cNvPicPr>
-            <a:picLocks noChangeAspect="1"/>
-          </p:cNvPicPr>
-          <p:nvPr/>
-        </p:nvPicPr>
-        <p:blipFill>
-          <a:blip r:embed="rId3"/>
-          <a:stretch>
-            <a:fillRect/>
-          </a:stretch>
-        </p:blipFill>
-        <p:spPr>
-          <a:xfrm>
-            <a:off x="6132467" y="48566"/>
-            <a:ext cx="5862898" cy="480072"/>
-          </a:xfrm>
-          <a:prstGeom prst="rect">
-            <a:avLst/>
-          </a:prstGeom>
-        </p:spPr>
-      </p:pic>
       <p:sp>
         <p:nvSpPr>
           <p:cNvPr id="2" name="Titre 1">
@@ -22940,6 +23147,66 @@
           </a:p>
         </p:txBody>
       </p:sp>
+      <p:pic>
+        <p:nvPicPr>
+          <p:cNvPr id="4" name="Image 3">
+            <a:extLst>
+              <a:ext uri="{FF2B5EF4-FFF2-40B4-BE49-F238E27FC236}">
+                <a16:creationId xmlns:a16="http://schemas.microsoft.com/office/drawing/2014/main" id="{87B162CD-29C9-8282-54D3-42305A05BBDB}"/>
+              </a:ext>
+            </a:extLst>
+          </p:cNvPr>
+          <p:cNvPicPr>
+            <a:picLocks noChangeAspect="1"/>
+          </p:cNvPicPr>
+          <p:nvPr/>
+        </p:nvPicPr>
+        <p:blipFill>
+          <a:blip r:embed="rId2"/>
+          <a:stretch>
+            <a:fillRect/>
+          </a:stretch>
+        </p:blipFill>
+        <p:spPr>
+          <a:xfrm>
+            <a:off x="6259902" y="86185"/>
+            <a:ext cx="5680138" cy="509033"/>
+          </a:xfrm>
+          <a:prstGeom prst="rect">
+            <a:avLst/>
+          </a:prstGeom>
+        </p:spPr>
+      </p:pic>
+      <p:pic>
+        <p:nvPicPr>
+          <p:cNvPr id="14" name="Image 13">
+            <a:extLst>
+              <a:ext uri="{FF2B5EF4-FFF2-40B4-BE49-F238E27FC236}">
+                <a16:creationId xmlns:a16="http://schemas.microsoft.com/office/drawing/2014/main" id="{6A2A4647-7262-15CB-0D26-15EA2FCE6F33}"/>
+              </a:ext>
+            </a:extLst>
+          </p:cNvPr>
+          <p:cNvPicPr>
+            <a:picLocks noChangeAspect="1"/>
+          </p:cNvPicPr>
+          <p:nvPr/>
+        </p:nvPicPr>
+        <p:blipFill>
+          <a:blip r:embed="rId3"/>
+          <a:stretch>
+            <a:fillRect/>
+          </a:stretch>
+        </p:blipFill>
+        <p:spPr>
+          <a:xfrm>
+            <a:off x="5594750" y="1350896"/>
+            <a:ext cx="6417313" cy="4156207"/>
+          </a:xfrm>
+          <a:prstGeom prst="rect">
+            <a:avLst/>
+          </a:prstGeom>
+        </p:spPr>
+      </p:pic>
     </p:spTree>
     <p:extLst>
       <p:ext uri="{BB962C8B-B14F-4D97-AF65-F5344CB8AC3E}">
@@ -23329,10 +23596,10 @@
       </p:sp>
       <p:pic>
         <p:nvPicPr>
-          <p:cNvPr id="3" name="Image 2" descr="Une image contenant graphique&#10;&#10;Description générée automatiquement">
+          <p:cNvPr id="7" name="Espace réservé du contenu 5">
             <a:extLst>
               <a:ext uri="{FF2B5EF4-FFF2-40B4-BE49-F238E27FC236}">
-                <a16:creationId xmlns:a16="http://schemas.microsoft.com/office/drawing/2014/main" id="{44520479-2BA5-BFA9-A625-E357D57D5054}"/>
+                <a16:creationId xmlns:a16="http://schemas.microsoft.com/office/drawing/2014/main" id="{33880B8D-D658-C4C6-CD2A-27FDD3A4AD3A}"/>
               </a:ext>
             </a:extLst>
           </p:cNvPr>
@@ -23349,8 +23616,8 @@
         </p:blipFill>
         <p:spPr>
           <a:xfrm>
-            <a:off x="5476806" y="1072345"/>
-            <a:ext cx="6699470" cy="4713288"/>
+            <a:off x="5590516" y="261939"/>
+            <a:ext cx="6586354" cy="509586"/>
           </a:xfrm>
           <a:prstGeom prst="rect">
             <a:avLst/>
@@ -23359,10 +23626,10 @@
       </p:pic>
       <p:pic>
         <p:nvPicPr>
-          <p:cNvPr id="7" name="Espace réservé du contenu 5">
+          <p:cNvPr id="8" name="Image 7">
             <a:extLst>
               <a:ext uri="{FF2B5EF4-FFF2-40B4-BE49-F238E27FC236}">
-                <a16:creationId xmlns:a16="http://schemas.microsoft.com/office/drawing/2014/main" id="{33880B8D-D658-C4C6-CD2A-27FDD3A4AD3A}"/>
+                <a16:creationId xmlns:a16="http://schemas.microsoft.com/office/drawing/2014/main" id="{5C0C7BF5-E498-DB8E-9663-92204810DE07}"/>
               </a:ext>
             </a:extLst>
           </p:cNvPr>
@@ -23379,8 +23646,8 @@
         </p:blipFill>
         <p:spPr>
           <a:xfrm>
-            <a:off x="5590516" y="261939"/>
-            <a:ext cx="6586354" cy="509586"/>
+            <a:off x="5563066" y="1072345"/>
+            <a:ext cx="6551716" cy="4439934"/>
           </a:xfrm>
           <a:prstGeom prst="rect">
             <a:avLst/>
@@ -23954,123 +24221,6 @@
           </a:fontRef>
         </p:style>
       </p:cxnSp>
-      <p:pic>
-        <p:nvPicPr>
-          <p:cNvPr id="5" name="Image 4" descr="Une image contenant graphique&#10;&#10;Description générée automatiquement">
-            <a:extLst>
-              <a:ext uri="{FF2B5EF4-FFF2-40B4-BE49-F238E27FC236}">
-                <a16:creationId xmlns:a16="http://schemas.microsoft.com/office/drawing/2014/main" id="{AE045932-0EEC-7EEA-D360-EAE2DDBDB4BC}"/>
-              </a:ext>
-            </a:extLst>
-          </p:cNvPr>
-          <p:cNvPicPr>
-            <a:picLocks noChangeAspect="1"/>
-          </p:cNvPicPr>
-          <p:nvPr/>
-        </p:nvPicPr>
-        <p:blipFill rotWithShape="1">
-          <a:blip r:embed="rId2"/>
-          <a:srcRect b="3592"/>
-          <a:stretch/>
-        </p:blipFill>
-        <p:spPr>
-          <a:xfrm>
-            <a:off x="6096000" y="445395"/>
-            <a:ext cx="5560004" cy="4185668"/>
-          </a:xfrm>
-          <a:prstGeom prst="rect">
-            <a:avLst/>
-          </a:prstGeom>
-        </p:spPr>
-      </p:pic>
-      <p:pic>
-        <p:nvPicPr>
-          <p:cNvPr id="10" name="Image 9" descr="Une image contenant graphique&#10;&#10;Description générée automatiquement">
-            <a:extLst>
-              <a:ext uri="{FF2B5EF4-FFF2-40B4-BE49-F238E27FC236}">
-                <a16:creationId xmlns:a16="http://schemas.microsoft.com/office/drawing/2014/main" id="{731727BA-9D94-E374-D5A3-69A9D6A8CF8E}"/>
-              </a:ext>
-            </a:extLst>
-          </p:cNvPr>
-          <p:cNvPicPr>
-            <a:picLocks noChangeAspect="1"/>
-          </p:cNvPicPr>
-          <p:nvPr/>
-        </p:nvPicPr>
-        <p:blipFill rotWithShape="1">
-          <a:blip r:embed="rId3"/>
-          <a:srcRect l="6298" r="6048"/>
-          <a:stretch/>
-        </p:blipFill>
-        <p:spPr>
-          <a:xfrm>
-            <a:off x="6520209" y="4805728"/>
-            <a:ext cx="1904032" cy="1896600"/>
-          </a:xfrm>
-          <a:prstGeom prst="rect">
-            <a:avLst/>
-          </a:prstGeom>
-        </p:spPr>
-      </p:pic>
-      <p:pic>
-        <p:nvPicPr>
-          <p:cNvPr id="8" name="Image 7" descr="Une image contenant graphique&#10;&#10;Description générée automatiquement">
-            <a:extLst>
-              <a:ext uri="{FF2B5EF4-FFF2-40B4-BE49-F238E27FC236}">
-                <a16:creationId xmlns:a16="http://schemas.microsoft.com/office/drawing/2014/main" id="{2D0E18F9-19E5-52BD-197A-68136C0BDDC5}"/>
-              </a:ext>
-            </a:extLst>
-          </p:cNvPr>
-          <p:cNvPicPr>
-            <a:picLocks noChangeAspect="1"/>
-          </p:cNvPicPr>
-          <p:nvPr/>
-        </p:nvPicPr>
-        <p:blipFill rotWithShape="1">
-          <a:blip r:embed="rId4"/>
-          <a:srcRect l="5218" r="2340"/>
-          <a:stretch/>
-        </p:blipFill>
-        <p:spPr>
-          <a:xfrm>
-            <a:off x="9086428" y="4805728"/>
-            <a:ext cx="1968596" cy="1896600"/>
-          </a:xfrm>
-          <a:prstGeom prst="rect">
-            <a:avLst/>
-          </a:prstGeom>
-        </p:spPr>
-      </p:pic>
-      <p:pic>
-        <p:nvPicPr>
-          <p:cNvPr id="12" name="Image 11">
-            <a:extLst>
-              <a:ext uri="{FF2B5EF4-FFF2-40B4-BE49-F238E27FC236}">
-                <a16:creationId xmlns:a16="http://schemas.microsoft.com/office/drawing/2014/main" id="{498EA64B-92BB-1FB3-F4F9-37FAE8CCF09F}"/>
-              </a:ext>
-            </a:extLst>
-          </p:cNvPr>
-          <p:cNvPicPr>
-            <a:picLocks noChangeAspect="1"/>
-          </p:cNvPicPr>
-          <p:nvPr/>
-        </p:nvPicPr>
-        <p:blipFill>
-          <a:blip r:embed="rId5"/>
-          <a:stretch>
-            <a:fillRect/>
-          </a:stretch>
-        </p:blipFill>
-        <p:spPr>
-          <a:xfrm>
-            <a:off x="6655318" y="155672"/>
-            <a:ext cx="4230688" cy="303213"/>
-          </a:xfrm>
-          <a:prstGeom prst="rect">
-            <a:avLst/>
-          </a:prstGeom>
-        </p:spPr>
-      </p:pic>
       <p:sp>
         <p:nvSpPr>
           <p:cNvPr id="2" name="Titre 1">
@@ -24114,6 +24264,126 @@
           </a:p>
         </p:txBody>
       </p:sp>
+      <p:pic>
+        <p:nvPicPr>
+          <p:cNvPr id="4" name="Image 3">
+            <a:extLst>
+              <a:ext uri="{FF2B5EF4-FFF2-40B4-BE49-F238E27FC236}">
+                <a16:creationId xmlns:a16="http://schemas.microsoft.com/office/drawing/2014/main" id="{5814AFE1-AC7A-36CC-FDB5-AB800E75E7B4}"/>
+              </a:ext>
+            </a:extLst>
+          </p:cNvPr>
+          <p:cNvPicPr>
+            <a:picLocks noChangeAspect="1"/>
+          </p:cNvPicPr>
+          <p:nvPr/>
+        </p:nvPicPr>
+        <p:blipFill>
+          <a:blip r:embed="rId2"/>
+          <a:stretch>
+            <a:fillRect/>
+          </a:stretch>
+        </p:blipFill>
+        <p:spPr>
+          <a:xfrm>
+            <a:off x="6804052" y="4805728"/>
+            <a:ext cx="2016475" cy="1896600"/>
+          </a:xfrm>
+          <a:prstGeom prst="rect">
+            <a:avLst/>
+          </a:prstGeom>
+        </p:spPr>
+      </p:pic>
+      <p:pic>
+        <p:nvPicPr>
+          <p:cNvPr id="7" name="Image 6">
+            <a:extLst>
+              <a:ext uri="{FF2B5EF4-FFF2-40B4-BE49-F238E27FC236}">
+                <a16:creationId xmlns:a16="http://schemas.microsoft.com/office/drawing/2014/main" id="{0C91C689-ABB9-87AF-C007-D1E21B11FD8F}"/>
+              </a:ext>
+            </a:extLst>
+          </p:cNvPr>
+          <p:cNvPicPr>
+            <a:picLocks noChangeAspect="1"/>
+          </p:cNvPicPr>
+          <p:nvPr/>
+        </p:nvPicPr>
+        <p:blipFill>
+          <a:blip r:embed="rId3"/>
+          <a:stretch>
+            <a:fillRect/>
+          </a:stretch>
+        </p:blipFill>
+        <p:spPr>
+          <a:xfrm>
+            <a:off x="9149756" y="4805728"/>
+            <a:ext cx="1995069" cy="1896600"/>
+          </a:xfrm>
+          <a:prstGeom prst="rect">
+            <a:avLst/>
+          </a:prstGeom>
+        </p:spPr>
+      </p:pic>
+      <p:pic>
+        <p:nvPicPr>
+          <p:cNvPr id="11" name="Image 10">
+            <a:extLst>
+              <a:ext uri="{FF2B5EF4-FFF2-40B4-BE49-F238E27FC236}">
+                <a16:creationId xmlns:a16="http://schemas.microsoft.com/office/drawing/2014/main" id="{DF0453D7-6ECA-253D-713B-B34F3A07437F}"/>
+              </a:ext>
+            </a:extLst>
+          </p:cNvPr>
+          <p:cNvPicPr>
+            <a:picLocks noChangeAspect="1"/>
+          </p:cNvPicPr>
+          <p:nvPr/>
+        </p:nvPicPr>
+        <p:blipFill>
+          <a:blip r:embed="rId4"/>
+          <a:stretch>
+            <a:fillRect/>
+          </a:stretch>
+        </p:blipFill>
+        <p:spPr>
+          <a:xfrm>
+            <a:off x="6723458" y="37317"/>
+            <a:ext cx="4230688" cy="502777"/>
+          </a:xfrm>
+          <a:prstGeom prst="rect">
+            <a:avLst/>
+          </a:prstGeom>
+        </p:spPr>
+      </p:pic>
+      <p:pic>
+        <p:nvPicPr>
+          <p:cNvPr id="14" name="Image 13">
+            <a:extLst>
+              <a:ext uri="{FF2B5EF4-FFF2-40B4-BE49-F238E27FC236}">
+                <a16:creationId xmlns:a16="http://schemas.microsoft.com/office/drawing/2014/main" id="{DD1DF088-9E36-6FDC-8EFD-1E7FC0512CE0}"/>
+              </a:ext>
+            </a:extLst>
+          </p:cNvPr>
+          <p:cNvPicPr>
+            <a:picLocks noChangeAspect="1"/>
+          </p:cNvPicPr>
+          <p:nvPr/>
+        </p:nvPicPr>
+        <p:blipFill>
+          <a:blip r:embed="rId5"/>
+          <a:stretch>
+            <a:fillRect/>
+          </a:stretch>
+        </p:blipFill>
+        <p:spPr>
+          <a:xfrm>
+            <a:off x="5841754" y="540094"/>
+            <a:ext cx="6226589" cy="4129551"/>
+          </a:xfrm>
+          <a:prstGeom prst="rect">
+            <a:avLst/>
+          </a:prstGeom>
+        </p:spPr>
+      </p:pic>
     </p:spTree>
     <p:extLst>
       <p:ext uri="{BB962C8B-B14F-4D97-AF65-F5344CB8AC3E}">
@@ -24314,10 +24584,10 @@
       </p:sp>
       <p:pic>
         <p:nvPicPr>
-          <p:cNvPr id="3" name="Image 2" descr="Une image contenant graphique&#10;&#10;Description générée automatiquement">
+          <p:cNvPr id="6" name="Image 5">
             <a:extLst>
               <a:ext uri="{FF2B5EF4-FFF2-40B4-BE49-F238E27FC236}">
-                <a16:creationId xmlns:a16="http://schemas.microsoft.com/office/drawing/2014/main" id="{748BA0C2-E456-33AA-51F6-8C08E569EC48}"/>
+                <a16:creationId xmlns:a16="http://schemas.microsoft.com/office/drawing/2014/main" id="{B3618FEF-3CCD-FD1C-E0D4-CAC26FCFEDA1}"/>
               </a:ext>
             </a:extLst>
           </p:cNvPr>
@@ -24326,15 +24596,16 @@
           </p:cNvPicPr>
           <p:nvPr/>
         </p:nvPicPr>
-        <p:blipFill rotWithShape="1">
+        <p:blipFill>
           <a:blip r:embed="rId2"/>
-          <a:srcRect b="2460"/>
-          <a:stretch/>
+          <a:stretch>
+            <a:fillRect/>
+          </a:stretch>
         </p:blipFill>
         <p:spPr>
           <a:xfrm>
-            <a:off x="5589615" y="1368426"/>
-            <a:ext cx="6472182" cy="5326046"/>
+            <a:off x="6201554" y="336468"/>
+            <a:ext cx="5429964" cy="694529"/>
           </a:xfrm>
           <a:prstGeom prst="rect">
             <a:avLst/>
@@ -24343,10 +24614,10 @@
       </p:pic>
       <p:pic>
         <p:nvPicPr>
-          <p:cNvPr id="4" name="Image 3">
+          <p:cNvPr id="8" name="Image 7">
             <a:extLst>
               <a:ext uri="{FF2B5EF4-FFF2-40B4-BE49-F238E27FC236}">
-                <a16:creationId xmlns:a16="http://schemas.microsoft.com/office/drawing/2014/main" id="{1DA5AB4F-5500-6892-33EF-6EA1B95FBC7C}"/>
+                <a16:creationId xmlns:a16="http://schemas.microsoft.com/office/drawing/2014/main" id="{7A3DB0D9-83FA-0276-4A48-F43DEEC25AF7}"/>
               </a:ext>
             </a:extLst>
           </p:cNvPr>
@@ -24363,8 +24634,8 @@
         </p:blipFill>
         <p:spPr>
           <a:xfrm>
-            <a:off x="6115292" y="640080"/>
-            <a:ext cx="5459413" cy="430213"/>
+            <a:off x="5589615" y="1150633"/>
+            <a:ext cx="6549472" cy="5326046"/>
           </a:xfrm>
           <a:prstGeom prst="rect">
             <a:avLst/>

</xml_diff>